<commit_message>
Simplify PowerPoint presentation - less technical language
Co-authored-by: irfan-ghzl <106226088+irfan-ghzl@users.noreply.github.com>
</commit_message>
<xml_diff>
--- a/PRESENTASI_SISTEM_PENGADUAN_MASYARAKAT.pptx
+++ b/PRESENTASI_SISTEM_PENGADUAN_MASYARAKAT.pptx
@@ -3183,7 +3183,7 @@
               </a:defRPr>
             </a:pPr>
             <a:r>
-              <a:t>SISTEM PENGADUAN MASYARAKAT BERBASIS WEB</a:t>
+              <a:t>SISTEM PENGADUAN MASYARAKAT</a:t>
             </a:r>
           </a:p>
         </p:txBody>
@@ -3218,7 +3218,7 @@
               </a:defRPr>
             </a:pPr>
             <a:r>
-              <a:t>Implementasi E-Government untuk Pelayanan Publik Digital</a:t>
+              <a:t>Layanan Pengaduan Digital untuk Masyarakat</a:t>
             </a:r>
           </a:p>
         </p:txBody>
@@ -3314,7 +3314,7 @@
               </a:defRPr>
             </a:pPr>
             <a:r>
-              <a:t>Analisis Kebutuhan Sistem</a:t>
+              <a:t>Kebutuhan Sistem</a:t>
             </a:r>
           </a:p>
         </p:txBody>
@@ -3343,91 +3343,61 @@
           <a:p>
             <a:pPr>
               <a:spcAft>
-                <a:spcPts val="1200"/>
+                <a:spcPts val="1400"/>
               </a:spcAft>
-              <a:defRPr sz="1800">
+              <a:defRPr sz="2000">
                 <a:solidFill>
                   <a:srgbClr val="003366"/>
                 </a:solidFill>
               </a:defRPr>
             </a:pPr>
             <a:r>
-              <a:t>• Kebutuhan Fungsional: Registrasi, login, CRUD pengaduan, manajemen status, notifikasi, rating</a:t>
+              <a:t>• Kemudahan: Sistem harus mudah dipahami dan digunakan</a:t>
             </a:r>
           </a:p>
           <a:p>
             <a:pPr>
               <a:spcAft>
-                <a:spcPts val="1200"/>
+                <a:spcPts val="1400"/>
               </a:spcAft>
-              <a:defRPr sz="1800">
+              <a:defRPr sz="2000">
                 <a:solidFill>
                   <a:srgbClr val="003366"/>
                 </a:solidFill>
               </a:defRPr>
             </a:pPr>
             <a:r>
-              <a:t>• Performance: Minimal 100 concurrent users</a:t>
+              <a:t>• Kecepatan: Sistem harus berjalan dengan cepat tanpa hambatan</a:t>
             </a:r>
           </a:p>
           <a:p>
             <a:pPr>
               <a:spcAft>
-                <a:spcPts val="1200"/>
+                <a:spcPts val="1400"/>
               </a:spcAft>
-              <a:defRPr sz="1800">
+              <a:defRPr sz="2000">
                 <a:solidFill>
                   <a:srgbClr val="003366"/>
                 </a:solidFill>
               </a:defRPr>
             </a:pPr>
             <a:r>
-              <a:t>• Security: Autentikasi JWT dan enkripsi password dengan bcrypt</a:t>
+              <a:t>• Keamanan: Data masyarakat harus dilindungi dengan baik</a:t>
             </a:r>
           </a:p>
           <a:p>
             <a:pPr>
               <a:spcAft>
-                <a:spcPts val="1200"/>
+                <a:spcPts val="1400"/>
               </a:spcAft>
-              <a:defRPr sz="1800">
+              <a:defRPr sz="2000">
                 <a:solidFill>
                   <a:srgbClr val="003366"/>
                 </a:solidFill>
               </a:defRPr>
             </a:pPr>
             <a:r>
-              <a:t>• Usability: Antarmuka intuitif dan responsif</a:t>
-            </a:r>
-          </a:p>
-          <a:p>
-            <a:pPr>
-              <a:spcAft>
-                <a:spcPts val="1200"/>
-              </a:spcAft>
-              <a:defRPr sz="1800">
-                <a:solidFill>
-                  <a:srgbClr val="003366"/>
-                </a:solidFill>
-              </a:defRPr>
-            </a:pPr>
-            <a:r>
-              <a:t>• Scalability: Arsitektur yang mendukung pertumbuhan pengguna</a:t>
-            </a:r>
-          </a:p>
-          <a:p>
-            <a:pPr>
-              <a:spcAft>
-                <a:spcPts val="1200"/>
-              </a:spcAft>
-              <a:defRPr sz="1800">
-                <a:solidFill>
-                  <a:srgbClr val="003366"/>
-                </a:solidFill>
-              </a:defRPr>
-            </a:pPr>
-            <a:r>
-              <a:t>• Availability: Uptime 99%</a:t>
+              <a:t>• Ketersediaan: Sistem dapat diakses kapan saja diperlukan</a:t>
             </a:r>
           </a:p>
         </p:txBody>
@@ -3558,7 +3528,7 @@
               </a:defRPr>
             </a:pPr>
             <a:r>
-              <a:t>ANALISIS &amp; PERANCANGAN</a:t>
+              <a:t>ANALISIS</a:t>
             </a:r>
           </a:p>
         </p:txBody>
@@ -3654,7 +3624,7 @@
               </a:defRPr>
             </a:pPr>
             <a:r>
-              <a:t>Arsitektur Sistem</a:t>
+              <a:t>Siapa yang Menggunakan Sistem?</a:t>
             </a:r>
           </a:p>
         </p:txBody>
@@ -3683,91 +3653,46 @@
           <a:p>
             <a:pPr>
               <a:spcAft>
-                <a:spcPts val="1200"/>
+                <a:spcPts val="1400"/>
               </a:spcAft>
-              <a:defRPr sz="1800">
+              <a:defRPr sz="2000">
                 <a:solidFill>
                   <a:srgbClr val="003366"/>
                 </a:solidFill>
               </a:defRPr>
             </a:pPr>
             <a:r>
-              <a:t>• Arsitektur Client-Server: Pemisahan frontend dan backend</a:t>
+              <a:t>• Masyarakat: Membuat dan memantau pengaduan</a:t>
             </a:r>
           </a:p>
           <a:p>
             <a:pPr>
               <a:spcAft>
-                <a:spcPts val="1200"/>
+                <a:spcPts val="1400"/>
               </a:spcAft>
-              <a:defRPr sz="1800">
+              <a:defRPr sz="2000">
                 <a:solidFill>
                   <a:srgbClr val="003366"/>
                 </a:solidFill>
               </a:defRPr>
             </a:pPr>
             <a:r>
-              <a:t>• Frontend (React.js): Aplikasi yang berjalan di browser pengguna</a:t>
+              <a:t>• Petugas: Menangani dan merespons pengaduan</a:t>
             </a:r>
           </a:p>
           <a:p>
             <a:pPr>
               <a:spcAft>
-                <a:spcPts val="1200"/>
+                <a:spcPts val="1400"/>
               </a:spcAft>
-              <a:defRPr sz="1800">
+              <a:defRPr sz="2000">
                 <a:solidFill>
                   <a:srgbClr val="003366"/>
                 </a:solidFill>
               </a:defRPr>
             </a:pPr>
             <a:r>
-              <a:t>• Backend (Node.js + Express.js): RESTful API untuk business logic</a:t>
-            </a:r>
-          </a:p>
-          <a:p>
-            <a:pPr>
-              <a:spcAft>
-                <a:spcPts val="1200"/>
-              </a:spcAft>
-              <a:defRPr sz="1800">
-                <a:solidFill>
-                  <a:srgbClr val="003366"/>
-                </a:solidFill>
-              </a:defRPr>
-            </a:pPr>
-            <a:r>
-              <a:t>• Database (PostgreSQL): Penyimpanan data persistent dengan ACID compliance</a:t>
-            </a:r>
-          </a:p>
-          <a:p>
-            <a:pPr>
-              <a:spcAft>
-                <a:spcPts val="1200"/>
-              </a:spcAft>
-              <a:defRPr sz="1800">
-                <a:solidFill>
-                  <a:srgbClr val="003366"/>
-                </a:solidFill>
-              </a:defRPr>
-            </a:pPr>
-            <a:r>
-              <a:t>• Authentication: JWT (JSON Web Token) untuk manajemen sesi</a:t>
-            </a:r>
-          </a:p>
-          <a:p>
-            <a:pPr>
-              <a:spcAft>
-                <a:spcPts val="1200"/>
-              </a:spcAft>
-              <a:defRPr sz="1800">
-                <a:solidFill>
-                  <a:srgbClr val="003366"/>
-                </a:solidFill>
-              </a:defRPr>
-            </a:pPr>
-            <a:r>
-              <a:t>• Containerization: Docker untuk deployment yang konsisten</a:t>
+              <a:t>• Admin: Mengelola sistem dan pengguna secara keseluruhan</a:t>
             </a:r>
           </a:p>
         </p:txBody>
@@ -3863,7 +3788,7 @@
               </a:defRPr>
             </a:pPr>
             <a:r>
-              <a:t>Diagram UML</a:t>
+              <a:t>Alur Pengaduan</a:t>
             </a:r>
           </a:p>
         </p:txBody>
@@ -3892,76 +3817,91 @@
           <a:p>
             <a:pPr>
               <a:spcAft>
-                <a:spcPts val="1200"/>
+                <a:spcPts val="1400"/>
               </a:spcAft>
-              <a:defRPr sz="1800">
+              <a:defRPr sz="2000">
                 <a:solidFill>
                   <a:srgbClr val="003366"/>
                 </a:solidFill>
               </a:defRPr>
             </a:pPr>
             <a:r>
-              <a:t>• Use Case Diagram: 3 aktor (Masyarakat, Petugas, Admin) dengan 15+ use cases</a:t>
+              <a:t>• Masyarakat mendaftar dan masuk ke sistem</a:t>
             </a:r>
           </a:p>
           <a:p>
             <a:pPr>
               <a:spcAft>
-                <a:spcPts val="1200"/>
+                <a:spcPts val="1400"/>
               </a:spcAft>
-              <a:defRPr sz="1800">
+              <a:defRPr sz="2000">
                 <a:solidFill>
                   <a:srgbClr val="003366"/>
                 </a:solidFill>
               </a:defRPr>
             </a:pPr>
             <a:r>
-              <a:t>• Activity Diagram: Alur proses pengaduan dari registrasi hingga penyelesaian</a:t>
+              <a:t>• Membuat pengaduan dengan mengisi formulir</a:t>
             </a:r>
           </a:p>
           <a:p>
             <a:pPr>
               <a:spcAft>
-                <a:spcPts val="1200"/>
+                <a:spcPts val="1400"/>
               </a:spcAft>
-              <a:defRPr sz="1800">
+              <a:defRPr sz="2000">
                 <a:solidFill>
                   <a:srgbClr val="003366"/>
                 </a:solidFill>
               </a:defRPr>
             </a:pPr>
             <a:r>
-              <a:t>• Sequence Diagram: Interaksi antar komponen sistem</a:t>
+              <a:t>• Melampirkan bukti jika diperlukan</a:t>
             </a:r>
           </a:p>
           <a:p>
             <a:pPr>
               <a:spcAft>
-                <a:spcPts val="1200"/>
+                <a:spcPts val="1400"/>
               </a:spcAft>
-              <a:defRPr sz="1800">
+              <a:defRPr sz="2000">
                 <a:solidFill>
                   <a:srgbClr val="003366"/>
                 </a:solidFill>
               </a:defRPr>
             </a:pPr>
             <a:r>
-              <a:t>• Class Diagram: Struktur data User, Pengaduan, Kategori, Tanggapan, Notifikasi</a:t>
+              <a:t>• Petugas menerima dan memproses pengaduan</a:t>
             </a:r>
           </a:p>
           <a:p>
             <a:pPr>
               <a:spcAft>
-                <a:spcPts val="1200"/>
+                <a:spcPts val="1400"/>
               </a:spcAft>
-              <a:defRPr sz="1800">
+              <a:defRPr sz="2000">
                 <a:solidFill>
                   <a:srgbClr val="003366"/>
                 </a:solidFill>
               </a:defRPr>
             </a:pPr>
             <a:r>
-              <a:t>• Entity Relationship Diagram: Relasi antar tabel database</a:t>
+              <a:t>• Masyarakat menerima informasi update status</a:t>
+            </a:r>
+          </a:p>
+          <a:p>
+            <a:pPr>
+              <a:spcAft>
+                <a:spcPts val="1400"/>
+              </a:spcAft>
+              <a:defRPr sz="2000">
+                <a:solidFill>
+                  <a:srgbClr val="003366"/>
+                </a:solidFill>
+              </a:defRPr>
+            </a:pPr>
+            <a:r>
+              <a:t>• Pengaduan selesai ditangani</a:t>
             </a:r>
           </a:p>
         </p:txBody>
@@ -4188,7 +4128,7 @@
               </a:defRPr>
             </a:pPr>
             <a:r>
-              <a:t>Teknologi yang Digunakan</a:t>
+              <a:t>Fitur Utama Sistem</a:t>
             </a:r>
           </a:p>
         </p:txBody>
@@ -4217,76 +4157,76 @@
           <a:p>
             <a:pPr>
               <a:spcAft>
-                <a:spcPts val="1200"/>
+                <a:spcPts val="1400"/>
               </a:spcAft>
-              <a:defRPr sz="1800">
+              <a:defRPr sz="2000">
                 <a:solidFill>
                   <a:srgbClr val="003366"/>
                 </a:solidFill>
               </a:defRPr>
             </a:pPr>
             <a:r>
-              <a:t>• Backend: Node.js v18, Express.js v4, PostgreSQL v14, JWT, Bcrypt</a:t>
+              <a:t>• Halaman pendaftaran dan login yang mudah</a:t>
             </a:r>
           </a:p>
           <a:p>
             <a:pPr>
               <a:spcAft>
-                <a:spcPts val="1200"/>
+                <a:spcPts val="1400"/>
               </a:spcAft>
-              <a:defRPr sz="1800">
+              <a:defRPr sz="2000">
                 <a:solidFill>
                   <a:srgbClr val="003366"/>
                 </a:solidFill>
               </a:defRPr>
             </a:pPr>
             <a:r>
-              <a:t>• Frontend: React.js v18, React Router v6, Axios, CSS Modules</a:t>
+              <a:t>• Formulir pengaduan yang sederhana dan jelas</a:t>
             </a:r>
           </a:p>
           <a:p>
             <a:pPr>
               <a:spcAft>
-                <a:spcPts val="1200"/>
+                <a:spcPts val="1400"/>
               </a:spcAft>
-              <a:defRPr sz="1800">
+              <a:defRPr sz="2000">
                 <a:solidFill>
                   <a:srgbClr val="003366"/>
                 </a:solidFill>
               </a:defRPr>
             </a:pPr>
             <a:r>
-              <a:t>• DevOps: Docker &amp; Docker Compose, ESLint, Git</a:t>
+              <a:t>• Fitur upload bukti foto atau dokumen</a:t>
             </a:r>
           </a:p>
           <a:p>
             <a:pPr>
               <a:spcAft>
-                <a:spcPts val="1200"/>
+                <a:spcPts val="1400"/>
               </a:spcAft>
-              <a:defRPr sz="1800">
+              <a:defRPr sz="2000">
                 <a:solidFill>
                   <a:srgbClr val="003366"/>
                 </a:solidFill>
               </a:defRPr>
             </a:pPr>
             <a:r>
-              <a:t>• API Design: RESTful endpoints dengan middleware authentication</a:t>
+              <a:t>• Notifikasi update status pengaduan</a:t>
             </a:r>
           </a:p>
           <a:p>
             <a:pPr>
               <a:spcAft>
-                <a:spcPts val="1200"/>
+                <a:spcPts val="1400"/>
               </a:spcAft>
-              <a:defRPr sz="1800">
+              <a:defRPr sz="2000">
                 <a:solidFill>
                   <a:srgbClr val="003366"/>
                 </a:solidFill>
               </a:defRPr>
             </a:pPr>
             <a:r>
-              <a:t>• Struktur modular: controllers, routes, middleware, models</a:t>
+              <a:t>• Dashboard untuk melihat riwayat pengaduan</a:t>
             </a:r>
           </a:p>
         </p:txBody>
@@ -4382,7 +4322,7 @@
               </a:defRPr>
             </a:pPr>
             <a:r>
-              <a:t>Implementasi Keamanan</a:t>
+              <a:t>Keamanan Data</a:t>
             </a:r>
           </a:p>
         </p:txBody>
@@ -4411,91 +4351,61 @@
           <a:p>
             <a:pPr>
               <a:spcAft>
-                <a:spcPts val="1200"/>
+                <a:spcPts val="1400"/>
               </a:spcAft>
-              <a:defRPr sz="1800">
+              <a:defRPr sz="2000">
                 <a:solidFill>
                   <a:srgbClr val="003366"/>
                 </a:solidFill>
               </a:defRPr>
             </a:pPr>
             <a:r>
-              <a:t>• Autentikasi JWT: Token-based authentication dengan expiry time</a:t>
+              <a:t>• Akun dilindungi dengan username dan password</a:t>
             </a:r>
           </a:p>
           <a:p>
             <a:pPr>
               <a:spcAft>
-                <a:spcPts val="1200"/>
+                <a:spcPts val="1400"/>
               </a:spcAft>
-              <a:defRPr sz="1800">
+              <a:defRPr sz="2000">
                 <a:solidFill>
                   <a:srgbClr val="003366"/>
                 </a:solidFill>
               </a:defRPr>
             </a:pPr>
             <a:r>
-              <a:t>• Password Hashing: Bcrypt dengan salt rounds untuk enkripsi</a:t>
+              <a:t>• Data pengaduan hanya bisa dilihat oleh pihak yang berwenang</a:t>
             </a:r>
           </a:p>
           <a:p>
             <a:pPr>
               <a:spcAft>
-                <a:spcPts val="1200"/>
+                <a:spcPts val="1400"/>
               </a:spcAft>
-              <a:defRPr sz="1800">
+              <a:defRPr sz="2000">
                 <a:solidFill>
                   <a:srgbClr val="003366"/>
                 </a:solidFill>
               </a:defRPr>
             </a:pPr>
             <a:r>
-              <a:t>• Role-Based Access Control: Pembatasan akses berdasarkan role (masyarakat, petugas, admin)</a:t>
+              <a:t>• Setiap pengguna memiliki akses sesuai perannya</a:t>
             </a:r>
           </a:p>
           <a:p>
             <a:pPr>
               <a:spcAft>
-                <a:spcPts val="1200"/>
+                <a:spcPts val="1400"/>
               </a:spcAft>
-              <a:defRPr sz="1800">
+              <a:defRPr sz="2000">
                 <a:solidFill>
                   <a:srgbClr val="003366"/>
                 </a:solidFill>
               </a:defRPr>
             </a:pPr>
             <a:r>
-              <a:t>• Input Validation: Validasi dan sanitasi input untuk mencegah injection</a:t>
-            </a:r>
-          </a:p>
-          <a:p>
-            <a:pPr>
-              <a:spcAft>
-                <a:spcPts val="1200"/>
-              </a:spcAft>
-              <a:defRPr sz="1800">
-                <a:solidFill>
-                  <a:srgbClr val="003366"/>
-                </a:solidFill>
-              </a:defRPr>
-            </a:pPr>
-            <a:r>
-              <a:t>• CORS Configuration: Pembatasan akses cross-origin</a:t>
-            </a:r>
-          </a:p>
-          <a:p>
-            <a:pPr>
-              <a:spcAft>
-                <a:spcPts val="1200"/>
-              </a:spcAft>
-              <a:defRPr sz="1800">
-                <a:solidFill>
-                  <a:srgbClr val="003366"/>
-                </a:solidFill>
-              </a:defRPr>
-            </a:pPr>
-            <a:r>
-              <a:t>• Environment Variables: Pemisahan konfigurasi sensitif</a:t>
+              <a:t>• Informasi pribadi masyarakat dijaga kerahasiaannya</a:t>
             </a:r>
           </a:p>
         </p:txBody>
@@ -4626,7 +4536,7 @@
               </a:defRPr>
             </a:pPr>
             <a:r>
-              <a:t>HASIL &amp; PEMBAHASAN</a:t>
+              <a:t>HASIL</a:t>
             </a:r>
           </a:p>
         </p:txBody>
@@ -4722,7 +4632,7 @@
               </a:defRPr>
             </a:pPr>
             <a:r>
-              <a:t>Hasil Implementasi</a:t>
+              <a:t>Hasil yang Dicapai</a:t>
             </a:r>
           </a:p>
         </p:txBody>
@@ -4751,76 +4661,76 @@
           <a:p>
             <a:pPr>
               <a:spcAft>
-                <a:spcPts val="1200"/>
+                <a:spcPts val="1400"/>
               </a:spcAft>
-              <a:defRPr sz="1800">
+              <a:defRPr sz="2000">
                 <a:solidFill>
                   <a:srgbClr val="003366"/>
                 </a:solidFill>
               </a:defRPr>
             </a:pPr>
             <a:r>
-              <a:t>• Modul Masyarakat: Registrasi, login, dashboard, form pengaduan, pelacakan status, notifikasi, rating</a:t>
+              <a:t>• Sistem berhasil dibangun dan dapat digunakan dengan baik</a:t>
             </a:r>
           </a:p>
           <a:p>
             <a:pPr>
               <a:spcAft>
-                <a:spcPts val="1200"/>
+                <a:spcPts val="1400"/>
               </a:spcAft>
-              <a:defRPr sz="1800">
+              <a:defRPr sz="2000">
                 <a:solidFill>
                   <a:srgbClr val="003366"/>
                 </a:solidFill>
               </a:defRPr>
             </a:pPr>
             <a:r>
-              <a:t>• Modul Petugas: Dashboard pengaduan, detail lengkap dengan bukti, update status, pembuatan tanggapan</a:t>
+              <a:t>• Masyarakat dapat membuat pengaduan dengan mudah dari rumah</a:t>
             </a:r>
           </a:p>
           <a:p>
             <a:pPr>
               <a:spcAft>
-                <a:spcPts val="1200"/>
+                <a:spcPts val="1400"/>
               </a:spcAft>
-              <a:defRPr sz="1800">
+              <a:defRPr sz="2000">
                 <a:solidFill>
                   <a:srgbClr val="003366"/>
                 </a:solidFill>
               </a:defRPr>
             </a:pPr>
             <a:r>
-              <a:t>• Modul Admin: Dashboard statistik, manajemen pengguna, manajemen kategori, assignment, laporan</a:t>
+              <a:t>• Petugas dapat mengelola pengaduan dengan lebih teratur</a:t>
             </a:r>
           </a:p>
           <a:p>
             <a:pPr>
               <a:spcAft>
-                <a:spcPts val="1200"/>
+                <a:spcPts val="1400"/>
               </a:spcAft>
-              <a:defRPr sz="1800">
+              <a:defRPr sz="2000">
                 <a:solidFill>
                   <a:srgbClr val="003366"/>
                 </a:solidFill>
               </a:defRPr>
             </a:pPr>
             <a:r>
-              <a:t>• Alur Status: pending -&gt; diproses -&gt; selesai/ditolak</a:t>
+              <a:t>• Status pengaduan dapat dipantau secara langsung</a:t>
             </a:r>
           </a:p>
           <a:p>
             <a:pPr>
               <a:spcAft>
-                <a:spcPts val="1200"/>
+                <a:spcPts val="1400"/>
               </a:spcAft>
-              <a:defRPr sz="1800">
+              <a:defRPr sz="2000">
                 <a:solidFill>
                   <a:srgbClr val="003366"/>
                 </a:solidFill>
               </a:defRPr>
             </a:pPr>
             <a:r>
-              <a:t>• Upload Bukti: Mendukung upload file gambar sebagai bukti pengaduan</a:t>
+              <a:t>• Proses penanganan pengaduan menjadi lebih cepat dan transparan</a:t>
             </a:r>
           </a:p>
         </p:txBody>
@@ -4945,91 +4855,76 @@
           <a:p>
             <a:pPr>
               <a:spcAft>
-                <a:spcPts val="1200"/>
+                <a:spcPts val="1400"/>
               </a:spcAft>
-              <a:defRPr sz="1800">
+              <a:defRPr sz="2000">
                 <a:solidFill>
                   <a:srgbClr val="003366"/>
                 </a:solidFill>
               </a:defRPr>
             </a:pPr>
             <a:r>
-              <a:t>• Modular &amp; Scalable: Arsitektur terpisah memungkinkan pengembangan independen</a:t>
+              <a:t>• Mudah digunakan oleh semua kalangan masyarakat</a:t>
             </a:r>
           </a:p>
           <a:p>
             <a:pPr>
               <a:spcAft>
-                <a:spcPts val="1200"/>
+                <a:spcPts val="1400"/>
               </a:spcAft>
-              <a:defRPr sz="1800">
+              <a:defRPr sz="2000">
                 <a:solidFill>
                   <a:srgbClr val="003366"/>
                 </a:solidFill>
               </a:defRPr>
             </a:pPr>
             <a:r>
-              <a:t>• Keamanan: Implementasi JWT dan bcrypt memberikan lapisan keamanan memadai</a:t>
+              <a:t>• Dapat diakses dari komputer atau handphone</a:t>
             </a:r>
           </a:p>
           <a:p>
             <a:pPr>
               <a:spcAft>
-                <a:spcPts val="1200"/>
+                <a:spcPts val="1400"/>
               </a:spcAft>
-              <a:defRPr sz="1800">
+              <a:defRPr sz="2000">
                 <a:solidFill>
                   <a:srgbClr val="003366"/>
                 </a:solidFill>
               </a:defRPr>
             </a:pPr>
             <a:r>
-              <a:t>• User-Friendly: Antarmuka React yang responsif dengan UX yang baik</a:t>
+              <a:t>• Proses pengaduan menjadi lebih cepat dan efisien</a:t>
             </a:r>
           </a:p>
           <a:p>
             <a:pPr>
               <a:spcAft>
-                <a:spcPts val="1200"/>
+                <a:spcPts val="1400"/>
               </a:spcAft>
-              <a:defRPr sz="1800">
+              <a:defRPr sz="2000">
                 <a:solidFill>
                   <a:srgbClr val="003366"/>
                 </a:solidFill>
               </a:defRPr>
             </a:pPr>
             <a:r>
-              <a:t>• Real-Time Tracking: Masyarakat dapat memantau status pengaduan secara langsung</a:t>
+              <a:t>• Masyarakat dapat memantau perkembangan pengaduan mereka</a:t>
             </a:r>
           </a:p>
           <a:p>
             <a:pPr>
               <a:spcAft>
-                <a:spcPts val="1200"/>
+                <a:spcPts val="1400"/>
               </a:spcAft>
-              <a:defRPr sz="1800">
+              <a:defRPr sz="2000">
                 <a:solidFill>
                   <a:srgbClr val="003366"/>
                 </a:solidFill>
               </a:defRPr>
             </a:pPr>
             <a:r>
-              <a:t>• Containerized: Docker mempermudah deployment dan portabilitas</a:t>
-            </a:r>
-          </a:p>
-          <a:p>
-            <a:pPr>
-              <a:spcAft>
-                <a:spcPts val="1200"/>
-              </a:spcAft>
-              <a:defRPr sz="1800">
-                <a:solidFill>
-                  <a:srgbClr val="003366"/>
-                </a:solidFill>
-              </a:defRPr>
-            </a:pPr>
-            <a:r>
-              <a:t>• RESTful API: Memudahkan integrasi dengan sistem lain</a:t>
+              <a:t>• Membantu pemerintah dalam memberikan pelayanan yang lebih baik</a:t>
             </a:r>
           </a:p>
         </p:txBody>
@@ -5125,7 +5020,7 @@
               </a:defRPr>
             </a:pPr>
             <a:r>
-              <a:t>Abstrak</a:t>
+              <a:t>Tentang Sistem Ini</a:t>
             </a:r>
           </a:p>
         </p:txBody>
@@ -5154,91 +5049,76 @@
           <a:p>
             <a:pPr>
               <a:spcAft>
-                <a:spcPts val="1200"/>
+                <a:spcPts val="1400"/>
               </a:spcAft>
-              <a:defRPr sz="1800">
+              <a:defRPr sz="2000">
                 <a:solidFill>
                   <a:srgbClr val="003366"/>
                 </a:solidFill>
               </a:defRPr>
             </a:pPr>
             <a:r>
-              <a:t>• Penelitian bertujuan mengembangkan Sistem Pengaduan Masyarakat berbasis web sebagai implementasi E-Government</a:t>
+              <a:t>• Sistem online untuk menyampaikan pengaduan kepada pemerintah</a:t>
             </a:r>
           </a:p>
           <a:p>
             <a:pPr>
               <a:spcAft>
-                <a:spcPts val="1200"/>
+                <a:spcPts val="1400"/>
               </a:spcAft>
-              <a:defRPr sz="1800">
+              <a:defRPr sz="2000">
                 <a:solidFill>
                   <a:srgbClr val="003366"/>
                 </a:solidFill>
               </a:defRPr>
             </a:pPr>
             <a:r>
-              <a:t>• Teknologi: Node.js + Express.js (Backend), React.js (Frontend), PostgreSQL (Database)</a:t>
+              <a:t>• Masyarakat dapat melaporkan keluhan dari mana saja dan kapan saja</a:t>
             </a:r>
           </a:p>
           <a:p>
             <a:pPr>
               <a:spcAft>
-                <a:spcPts val="1200"/>
+                <a:spcPts val="1400"/>
               </a:spcAft>
-              <a:defRPr sz="1800">
+              <a:defRPr sz="2000">
                 <a:solidFill>
                   <a:srgbClr val="003366"/>
                 </a:solidFill>
               </a:defRPr>
             </a:pPr>
             <a:r>
-              <a:t>• Fitur utama: registrasi, pembuatan pengaduan, pelacakan status, notifikasi, dan rating</a:t>
+              <a:t>• Mudah melacak perkembangan pengaduan yang sudah disampaikan</a:t>
             </a:r>
           </a:p>
           <a:p>
             <a:pPr>
               <a:spcAft>
-                <a:spcPts val="1200"/>
+                <a:spcPts val="1400"/>
               </a:spcAft>
-              <a:defRPr sz="1800">
+              <a:defRPr sz="2000">
                 <a:solidFill>
                   <a:srgbClr val="003366"/>
                 </a:solidFill>
               </a:defRPr>
             </a:pPr>
             <a:r>
-              <a:t>• Tiga modul pengguna: Masyarakat, Petugas, dan Admin</a:t>
+              <a:t>• Membantu pemerintah merespons keluhan masyarakat dengan lebih cepat</a:t>
             </a:r>
           </a:p>
           <a:p>
             <a:pPr>
               <a:spcAft>
-                <a:spcPts val="1200"/>
+                <a:spcPts val="1400"/>
               </a:spcAft>
-              <a:defRPr sz="1800">
+              <a:defRPr sz="2000">
                 <a:solidFill>
                   <a:srgbClr val="003366"/>
                 </a:solidFill>
               </a:defRPr>
             </a:pPr>
             <a:r>
-              <a:t>• Sistem mendukung transparansi dan akuntabilitas pelayanan publik</a:t>
-            </a:r>
-          </a:p>
-          <a:p>
-            <a:pPr>
-              <a:spcAft>
-                <a:spcPts val="1200"/>
-              </a:spcAft>
-              <a:defRPr sz="1800">
-                <a:solidFill>
-                  <a:srgbClr val="003366"/>
-                </a:solidFill>
-              </a:defRPr>
-            </a:pPr>
-            <a:r>
-              <a:t>• Kata Kunci: E-Government, Web Application, Node.js, React.js, Sistem Pengaduan</a:t>
+              <a:t>• Meningkatkan transparansi dalam pelayanan publik</a:t>
             </a:r>
           </a:p>
         </p:txBody>
@@ -5369,7 +5249,7 @@
               </a:defRPr>
             </a:pPr>
             <a:r>
-              <a:t>KESIMPULAN &amp; SARAN</a:t>
+              <a:t>KESIMPULAN</a:t>
             </a:r>
           </a:p>
         </p:txBody>
@@ -5494,76 +5374,76 @@
           <a:p>
             <a:pPr>
               <a:spcAft>
-                <a:spcPts val="1200"/>
+                <a:spcPts val="1400"/>
               </a:spcAft>
-              <a:defRPr sz="1800">
+              <a:defRPr sz="2000">
                 <a:solidFill>
                   <a:srgbClr val="003366"/>
                 </a:solidFill>
               </a:defRPr>
             </a:pPr>
             <a:r>
-              <a:t>• Sistem Pengaduan Masyarakat berbasis web berhasil dikembangkan dengan Node.js, Express.js, React.js, dan PostgreSQL</a:t>
+              <a:t>• Sistem pengaduan online berhasil dikembangkan dengan baik</a:t>
             </a:r>
           </a:p>
           <a:p>
             <a:pPr>
               <a:spcAft>
-                <a:spcPts val="1200"/>
+                <a:spcPts val="1400"/>
               </a:spcAft>
-              <a:defRPr sz="1800">
+              <a:defRPr sz="2000">
                 <a:solidFill>
                   <a:srgbClr val="003366"/>
                 </a:solidFill>
               </a:defRPr>
             </a:pPr>
             <a:r>
-              <a:t>• Sistem memfasilitasi proses pengaduan lengkap: registrasi, pembuatan, pelacakan, hingga penyelesaian</a:t>
+              <a:t>• Masyarakat kini memiliki cara yang lebih mudah untuk menyampaikan keluhan</a:t>
             </a:r>
           </a:p>
           <a:p>
             <a:pPr>
               <a:spcAft>
-                <a:spcPts val="1200"/>
+                <a:spcPts val="1400"/>
               </a:spcAft>
-              <a:defRPr sz="1800">
+              <a:defRPr sz="2000">
                 <a:solidFill>
                   <a:srgbClr val="003366"/>
                 </a:solidFill>
               </a:defRPr>
             </a:pPr>
             <a:r>
-              <a:t>• Arsitektur client-server memberikan fleksibilitas, skalabilitas, dan kemudahan pemeliharaan</a:t>
+              <a:t>• Pemerintah dapat merespons pengaduan dengan lebih cepat dan terorganisir</a:t>
             </a:r>
           </a:p>
           <a:p>
             <a:pPr>
               <a:spcAft>
-                <a:spcPts val="1200"/>
+                <a:spcPts val="1400"/>
               </a:spcAft>
-              <a:defRPr sz="1800">
+              <a:defRPr sz="2000">
                 <a:solidFill>
                   <a:srgbClr val="003366"/>
                 </a:solidFill>
               </a:defRPr>
             </a:pPr>
             <a:r>
-              <a:t>• Implementasi keamanan JWT dan password hashing memberikan perlindungan yang memadai</a:t>
+              <a:t>• Sistem membantu meningkatkan kualitas pelayanan publik</a:t>
             </a:r>
           </a:p>
           <a:p>
             <a:pPr>
               <a:spcAft>
-                <a:spcPts val="1200"/>
+                <a:spcPts val="1400"/>
               </a:spcAft>
-              <a:defRPr sz="1800">
+              <a:defRPr sz="2000">
                 <a:solidFill>
                   <a:srgbClr val="003366"/>
                 </a:solidFill>
               </a:defRPr>
             </a:pPr>
             <a:r>
-              <a:t>• Sistem telah melalui pengujian unit dan integrasi dengan hasil memuaskan</a:t>
+              <a:t>• Transparansi dalam penanganan pengaduan semakin meningkat</a:t>
             </a:r>
           </a:p>
         </p:txBody>
@@ -5688,91 +5568,61 @@
           <a:p>
             <a:pPr>
               <a:spcAft>
-                <a:spcPts val="1200"/>
+                <a:spcPts val="1400"/>
               </a:spcAft>
-              <a:defRPr sz="1800">
+              <a:defRPr sz="2000">
                 <a:solidFill>
                   <a:srgbClr val="003366"/>
                 </a:solidFill>
               </a:defRPr>
             </a:pPr>
             <a:r>
-              <a:t>• Integrasi Multi-Channel: WhatsApp, SMS, email untuk notifikasi komprehensif</a:t>
+              <a:t>• Menambahkan notifikasi melalui SMS atau WhatsApp</a:t>
             </a:r>
           </a:p>
           <a:p>
             <a:pPr>
               <a:spcAft>
-                <a:spcPts val="1200"/>
+                <a:spcPts val="1400"/>
               </a:spcAft>
-              <a:defRPr sz="1800">
+              <a:defRPr sz="2000">
                 <a:solidFill>
                   <a:srgbClr val="003366"/>
                 </a:solidFill>
               </a:defRPr>
             </a:pPr>
             <a:r>
-              <a:t>• Mobile Application: Pengembangan aplikasi React Native untuk akses mobile</a:t>
+              <a:t>• Membuat aplikasi khusus untuk handphone</a:t>
             </a:r>
           </a:p>
           <a:p>
             <a:pPr>
               <a:spcAft>
-                <a:spcPts val="1200"/>
+                <a:spcPts val="1400"/>
               </a:spcAft>
-              <a:defRPr sz="1800">
+              <a:defRPr sz="2000">
                 <a:solidFill>
                   <a:srgbClr val="003366"/>
                 </a:solidFill>
               </a:defRPr>
             </a:pPr>
             <a:r>
-              <a:t>• Dashboard Analytics: Visualisasi data untuk mendukung pengambilan keputusan</a:t>
+              <a:t>• Menambahkan fitur chat langsung dengan petugas</a:t>
             </a:r>
           </a:p>
           <a:p>
             <a:pPr>
               <a:spcAft>
-                <a:spcPts val="1200"/>
+                <a:spcPts val="1400"/>
               </a:spcAft>
-              <a:defRPr sz="1800">
+              <a:defRPr sz="2000">
                 <a:solidFill>
                   <a:srgbClr val="003366"/>
                 </a:solidFill>
               </a:defRPr>
             </a:pPr>
             <a:r>
-              <a:t>• Integrasi API: Koneksi dengan sistem e-government lain (LAPOR!)</a:t>
-            </a:r>
-          </a:p>
-          <a:p>
-            <a:pPr>
-              <a:spcAft>
-                <a:spcPts val="1200"/>
-              </a:spcAft>
-              <a:defRPr sz="1800">
-                <a:solidFill>
-                  <a:srgbClr val="003366"/>
-                </a:solidFill>
-              </a:defRPr>
-            </a:pPr>
-            <a:r>
-              <a:t>• AI-Powered Categorization: Machine learning untuk kategorisasi otomatis</a:t>
-            </a:r>
-          </a:p>
-          <a:p>
-            <a:pPr>
-              <a:spcAft>
-                <a:spcPts val="1200"/>
-              </a:spcAft>
-              <a:defRPr sz="1800">
-                <a:solidFill>
-                  <a:srgbClr val="003366"/>
-                </a:solidFill>
-              </a:defRPr>
-            </a:pPr>
-            <a:r>
-              <a:t>• Real-Time Chat: Komunikasi langsung antara masyarakat dan petugas</a:t>
+              <a:t>• Mengintegrasikan dengan layanan pemerintah lainnya</a:t>
             </a:r>
           </a:p>
         </p:txBody>
@@ -5903,7 +5753,7 @@
               </a:defRPr>
             </a:pPr>
             <a:r>
-              <a:t>Sistem Pengaduan Masyarakat - E-Government Implementation</a:t>
+              <a:t>Sistem Pengaduan Masyarakat</a:t>
             </a:r>
           </a:p>
         </p:txBody>
@@ -6130,7 +5980,7 @@
               </a:defRPr>
             </a:pPr>
             <a:r>
-              <a:t>Latar Belakang</a:t>
+              <a:t>Mengapa Sistem Ini Dibutuhkan?</a:t>
             </a:r>
           </a:p>
         </p:txBody>
@@ -6159,76 +6009,76 @@
           <a:p>
             <a:pPr>
               <a:spcAft>
-                <a:spcPts val="1200"/>
+                <a:spcPts val="1400"/>
               </a:spcAft>
-              <a:defRPr sz="1800">
+              <a:defRPr sz="2000">
                 <a:solidFill>
                   <a:srgbClr val="003366"/>
                 </a:solidFill>
               </a:defRPr>
             </a:pPr>
             <a:r>
-              <a:t>• E-Government menjadi kebutuhan di era transformasi digital untuk meningkatkan pelayanan publik</a:t>
+              <a:t>• Masyarakat sering kesulitan menyampaikan keluhan ke pemerintah</a:t>
             </a:r>
           </a:p>
           <a:p>
             <a:pPr>
               <a:spcAft>
-                <a:spcPts val="1200"/>
+                <a:spcPts val="1400"/>
               </a:spcAft>
-              <a:defRPr sz="1800">
+              <a:defRPr sz="2000">
                 <a:solidFill>
                   <a:srgbClr val="003366"/>
                 </a:solidFill>
               </a:defRPr>
             </a:pPr>
             <a:r>
-              <a:t>• Perpres No. 76/2013 mewajibkan setiap instansi pemerintah menyediakan mekanisme pengaduan</a:t>
+              <a:t>• Pengaduan manual membutuhkan waktu dan tenaga yang lebih banyak</a:t>
             </a:r>
           </a:p>
           <a:p>
             <a:pPr>
               <a:spcAft>
-                <a:spcPts val="1200"/>
+                <a:spcPts val="1400"/>
               </a:spcAft>
-              <a:defRPr sz="1800">
+              <a:defRPr sz="2000">
                 <a:solidFill>
                   <a:srgbClr val="003366"/>
                 </a:solidFill>
               </a:defRPr>
             </a:pPr>
             <a:r>
-              <a:t>• Sistem pengaduan konvensional memiliki keterbatasan: akses terbatas, pelacakan sulit, transparansi rendah</a:t>
+              <a:t>• Sulit mengetahui apakah pengaduan sudah ditangani atau belum</a:t>
             </a:r>
           </a:p>
           <a:p>
             <a:pPr>
               <a:spcAft>
-                <a:spcPts val="1200"/>
+                <a:spcPts val="1400"/>
               </a:spcAft>
-              <a:defRPr sz="1800">
+              <a:defRPr sz="2000">
                 <a:solidFill>
                   <a:srgbClr val="003366"/>
                 </a:solidFill>
               </a:defRPr>
             </a:pPr>
             <a:r>
-              <a:t>• Teknologi web modern (Node.js, React.js) menawarkan solusi scalable dan user-friendly</a:t>
+              <a:t>• Era digital memungkinkan pelayanan yang lebih mudah dan cepat</a:t>
             </a:r>
           </a:p>
           <a:p>
             <a:pPr>
               <a:spcAft>
-                <a:spcPts val="1200"/>
+                <a:spcPts val="1400"/>
               </a:spcAft>
-              <a:defRPr sz="1800">
+              <a:defRPr sz="2000">
                 <a:solidFill>
                   <a:srgbClr val="003366"/>
                 </a:solidFill>
               </a:defRPr>
             </a:pPr>
             <a:r>
-              <a:t>• Kebutuhan sistem terpusat untuk mengelola, melacak, dan merespons pengaduan masyarakat secara efisien</a:t>
+              <a:t>• Diperlukan sistem yang mempermudah komunikasi masyarakat dengan pemerintah</a:t>
             </a:r>
           </a:p>
         </p:txBody>
@@ -6455,7 +6305,7 @@
               </a:defRPr>
             </a:pPr>
             <a:r>
-              <a:t>Rumusan Masalah</a:t>
+              <a:t>Pertanyaan yang Ingin Dijawab</a:t>
             </a:r>
           </a:p>
         </p:txBody>
@@ -6484,46 +6334,46 @@
           <a:p>
             <a:pPr>
               <a:spcAft>
-                <a:spcPts val="1200"/>
+                <a:spcPts val="1400"/>
               </a:spcAft>
-              <a:defRPr sz="1800">
+              <a:defRPr sz="2000">
                 <a:solidFill>
                   <a:srgbClr val="003366"/>
                 </a:solidFill>
               </a:defRPr>
             </a:pPr>
             <a:r>
-              <a:t>• Bagaimana merancang dan mengembangkan sistem pengaduan masyarakat berbasis web yang efektif dan efisien?</a:t>
+              <a:t>• Bagaimana cara mempermudah masyarakat dalam menyampaikan pengaduan?</a:t>
             </a:r>
           </a:p>
           <a:p>
             <a:pPr>
               <a:spcAft>
-                <a:spcPts val="1200"/>
+                <a:spcPts val="1400"/>
               </a:spcAft>
-              <a:defRPr sz="1800">
+              <a:defRPr sz="2000">
                 <a:solidFill>
                   <a:srgbClr val="003366"/>
                 </a:solidFill>
               </a:defRPr>
             </a:pPr>
             <a:r>
-              <a:t>• Bagaimana mengimplementasikan arsitektur sistem yang scalable menggunakan teknologi Node.js dan React.js?</a:t>
+              <a:t>• Bagaimana membuat sistem yang dapat diakses dari mana saja?</a:t>
             </a:r>
           </a:p>
           <a:p>
             <a:pPr>
               <a:spcAft>
-                <a:spcPts val="1200"/>
+                <a:spcPts val="1400"/>
               </a:spcAft>
-              <a:defRPr sz="1800">
+              <a:defRPr sz="2000">
                 <a:solidFill>
                   <a:srgbClr val="003366"/>
                 </a:solidFill>
               </a:defRPr>
             </a:pPr>
             <a:r>
-              <a:t>• Bagaimana memastikan keamanan data dan privasi pengguna dalam sistem pengaduan online?</a:t>
+              <a:t>• Bagaimana memastikan pengaduan ditangani dengan baik dan transparan?</a:t>
             </a:r>
           </a:p>
         </p:txBody>
@@ -6648,61 +6498,61 @@
           <a:p>
             <a:pPr>
               <a:spcAft>
-                <a:spcPts val="1200"/>
+                <a:spcPts val="1400"/>
               </a:spcAft>
-              <a:defRPr sz="1800">
+              <a:defRPr sz="2000">
                 <a:solidFill>
                   <a:srgbClr val="003366"/>
                 </a:solidFill>
               </a:defRPr>
             </a:pPr>
             <a:r>
-              <a:t>• Mengembangkan sistem pengaduan masyarakat berbasis web dengan fitur lengkap untuk mendukung E-Government</a:t>
+              <a:t>• Membuat sistem pengaduan yang mudah digunakan oleh semua kalangan</a:t>
             </a:r>
           </a:p>
           <a:p>
             <a:pPr>
               <a:spcAft>
-                <a:spcPts val="1200"/>
+                <a:spcPts val="1400"/>
               </a:spcAft>
-              <a:defRPr sz="1800">
+              <a:defRPr sz="2000">
                 <a:solidFill>
                   <a:srgbClr val="003366"/>
                 </a:solidFill>
               </a:defRPr>
             </a:pPr>
             <a:r>
-              <a:t>• Mengimplementasikan arsitektur client-server menggunakan Node.js, Express.js, PostgreSQL, dan React.js</a:t>
+              <a:t>• Menyediakan layanan yang bisa diakses 24 jam dari komputer atau handphone</a:t>
             </a:r>
           </a:p>
           <a:p>
             <a:pPr>
               <a:spcAft>
-                <a:spcPts val="1200"/>
+                <a:spcPts val="1400"/>
               </a:spcAft>
-              <a:defRPr sz="1800">
+              <a:defRPr sz="2000">
                 <a:solidFill>
                   <a:srgbClr val="003366"/>
                 </a:solidFill>
               </a:defRPr>
             </a:pPr>
             <a:r>
-              <a:t>• Menyediakan sistem yang memudahkan masyarakat menyampaikan pengaduan dan memantau statusnya</a:t>
+              <a:t>• Membantu masyarakat memantau status pengaduan mereka</a:t>
             </a:r>
           </a:p>
           <a:p>
             <a:pPr>
               <a:spcAft>
-                <a:spcPts val="1200"/>
+                <a:spcPts val="1400"/>
               </a:spcAft>
-              <a:defRPr sz="1800">
+              <a:defRPr sz="2000">
                 <a:solidFill>
                   <a:srgbClr val="003366"/>
                 </a:solidFill>
               </a:defRPr>
             </a:pPr>
             <a:r>
-              <a:t>• Memberikan tools bagi petugas dan admin untuk mengelola pengaduan secara efektif</a:t>
+              <a:t>• Memudahkan petugas dalam mengelola dan merespons pengaduan</a:t>
             </a:r>
           </a:p>
         </p:txBody>
@@ -6833,7 +6683,7 @@
               </a:defRPr>
             </a:pPr>
             <a:r>
-              <a:t>METODE PENELITIAN</a:t>
+              <a:t>METODE</a:t>
             </a:r>
           </a:p>
         </p:txBody>
@@ -6929,7 +6779,7 @@
               </a:defRPr>
             </a:pPr>
             <a:r>
-              <a:t>Metodologi Waterfall</a:t>
+              <a:t>Langkah-Langkah Pengembangan</a:t>
             </a:r>
           </a:p>
         </p:txBody>
@@ -6958,76 +6808,61 @@
           <a:p>
             <a:pPr>
               <a:spcAft>
-                <a:spcPts val="1200"/>
+                <a:spcPts val="1400"/>
               </a:spcAft>
-              <a:defRPr sz="1800">
+              <a:defRPr sz="2000">
                 <a:solidFill>
                   <a:srgbClr val="003366"/>
                 </a:solidFill>
               </a:defRPr>
             </a:pPr>
             <a:r>
-              <a:t>• Menggunakan metode pengembangan Waterfall (sequential approach)</a:t>
+              <a:t>• Tahap 1: Mengumpulkan informasi tentang kebutuhan masyarakat</a:t>
             </a:r>
           </a:p>
           <a:p>
             <a:pPr>
               <a:spcAft>
-                <a:spcPts val="1200"/>
+                <a:spcPts val="1400"/>
               </a:spcAft>
-              <a:defRPr sz="1800">
+              <a:defRPr sz="2000">
                 <a:solidFill>
                   <a:srgbClr val="003366"/>
                 </a:solidFill>
               </a:defRPr>
             </a:pPr>
             <a:r>
-              <a:t>• Tahap 1 - Analisis Kebutuhan: Identifikasi kebutuhan fungsional dan non-fungsional</a:t>
+              <a:t>• Tahap 2: Merancang tampilan dan alur penggunaan sistem</a:t>
             </a:r>
           </a:p>
           <a:p>
             <a:pPr>
               <a:spcAft>
-                <a:spcPts val="1200"/>
+                <a:spcPts val="1400"/>
               </a:spcAft>
-              <a:defRPr sz="1800">
+              <a:defRPr sz="2000">
                 <a:solidFill>
                   <a:srgbClr val="003366"/>
                 </a:solidFill>
               </a:defRPr>
             </a:pPr>
             <a:r>
-              <a:t>• Tahap 2 - Perancangan Sistem: Arsitektur sistem dan diagram UML</a:t>
+              <a:t>• Tahap 3: Membangun sistem sesuai rancangan</a:t>
             </a:r>
           </a:p>
           <a:p>
             <a:pPr>
               <a:spcAft>
-                <a:spcPts val="1200"/>
+                <a:spcPts val="1400"/>
               </a:spcAft>
-              <a:defRPr sz="1800">
+              <a:defRPr sz="2000">
                 <a:solidFill>
                   <a:srgbClr val="003366"/>
                 </a:solidFill>
               </a:defRPr>
             </a:pPr>
             <a:r>
-              <a:t>• Tahap 3 - Implementasi: Pengembangan backend dan frontend</a:t>
-            </a:r>
-          </a:p>
-          <a:p>
-            <a:pPr>
-              <a:spcAft>
-                <a:spcPts val="1200"/>
-              </a:spcAft>
-              <a:defRPr sz="1800">
-                <a:solidFill>
-                  <a:srgbClr val="003366"/>
-                </a:solidFill>
-              </a:defRPr>
-            </a:pPr>
-            <a:r>
-              <a:t>• Tahap 4 - Pengujian: Unit testing dan integration testing</a:t>
+              <a:t>• Tahap 4: Menguji sistem untuk memastikan berjalan dengan baik</a:t>
             </a:r>
           </a:p>
         </p:txBody>

</xml_diff>